<commit_message>
urban trees are awesome
</commit_message>
<xml_diff>
--- a/assets/Presentation1.pptx
+++ b/assets/Presentation1.pptx
@@ -4686,1063 +4686,1383 @@
           <a:chExt cx="0" cy="0"/>
         </a:xfrm>
       </p:grpSpPr>
-      <p:cxnSp>
-        <p:nvCxnSpPr>
-          <p:cNvPr id="5" name="Straight Connector 4">
-            <a:extLst>
-              <a:ext uri="{FF2B5EF4-FFF2-40B4-BE49-F238E27FC236}">
-                <a16:creationId xmlns:a16="http://schemas.microsoft.com/office/drawing/2014/main" id="{E32FFADF-52BF-7D4D-98FF-B3EA47976CCD}"/>
-              </a:ext>
-            </a:extLst>
-          </p:cNvPr>
-          <p:cNvCxnSpPr>
-            <a:cxnSpLocks/>
-          </p:cNvCxnSpPr>
+      <p:grpSp>
+        <p:nvGrpSpPr>
+          <p:cNvPr id="59" name="Group 58">
+            <a:extLst>
+              <a:ext uri="{FF2B5EF4-FFF2-40B4-BE49-F238E27FC236}">
+                <a16:creationId xmlns:a16="http://schemas.microsoft.com/office/drawing/2014/main" id="{CD9A6091-5EE7-754A-84C3-EB1BBA253C56}"/>
+              </a:ext>
+            </a:extLst>
+          </p:cNvPr>
+          <p:cNvGrpSpPr/>
           <p:nvPr/>
-        </p:nvCxnSpPr>
-        <p:spPr>
+        </p:nvGrpSpPr>
+        <p:grpSpPr>
           <a:xfrm>
-            <a:off x="3336481" y="1846052"/>
-            <a:ext cx="0" cy="2383101"/>
+            <a:off x="2986223" y="1196188"/>
+            <a:ext cx="3893558" cy="3428760"/>
+            <a:chOff x="2986223" y="1196188"/>
+            <a:chExt cx="3893558" cy="3428760"/>
           </a:xfrm>
-          <a:prstGeom prst="line">
-            <a:avLst/>
-          </a:prstGeom>
-          <a:ln w="38100" cap="rnd">
+        </p:grpSpPr>
+        <p:cxnSp>
+          <p:nvCxnSpPr>
+            <p:cNvPr id="5" name="Straight Connector 4">
+              <a:extLst>
+                <a:ext uri="{FF2B5EF4-FFF2-40B4-BE49-F238E27FC236}">
+                  <a16:creationId xmlns:a16="http://schemas.microsoft.com/office/drawing/2014/main" id="{E32FFADF-52BF-7D4D-98FF-B3EA47976CCD}"/>
+                </a:ext>
+              </a:extLst>
+            </p:cNvPr>
+            <p:cNvCxnSpPr>
+              <a:cxnSpLocks/>
+            </p:cNvCxnSpPr>
+            <p:nvPr/>
+          </p:nvCxnSpPr>
+          <p:spPr>
+            <a:xfrm>
+              <a:off x="3336481" y="1846052"/>
+              <a:ext cx="0" cy="2383101"/>
+            </a:xfrm>
+            <a:prstGeom prst="line">
+              <a:avLst/>
+            </a:prstGeom>
+            <a:ln w="38100" cap="rnd">
+              <a:solidFill>
+                <a:schemeClr val="tx1"/>
+              </a:solidFill>
+            </a:ln>
+          </p:spPr>
+          <p:style>
+            <a:lnRef idx="1">
+              <a:schemeClr val="accent1"/>
+            </a:lnRef>
+            <a:fillRef idx="0">
+              <a:schemeClr val="accent1"/>
+            </a:fillRef>
+            <a:effectRef idx="0">
+              <a:schemeClr val="accent1"/>
+            </a:effectRef>
+            <a:fontRef idx="minor">
+              <a:schemeClr val="tx1"/>
+            </a:fontRef>
+          </p:style>
+        </p:cxnSp>
+        <p:cxnSp>
+          <p:nvCxnSpPr>
+            <p:cNvPr id="8" name="Straight Connector 7">
+              <a:extLst>
+                <a:ext uri="{FF2B5EF4-FFF2-40B4-BE49-F238E27FC236}">
+                  <a16:creationId xmlns:a16="http://schemas.microsoft.com/office/drawing/2014/main" id="{6CB0B600-9472-004B-A1A6-8AF6F49F5309}"/>
+                </a:ext>
+              </a:extLst>
+            </p:cNvPr>
+            <p:cNvCxnSpPr>
+              <a:cxnSpLocks/>
+            </p:cNvCxnSpPr>
+            <p:nvPr/>
+          </p:nvCxnSpPr>
+          <p:spPr>
+            <a:xfrm rot="5400000">
+              <a:off x="5108131" y="2457503"/>
+              <a:ext cx="0" cy="3543300"/>
+            </a:xfrm>
+            <a:prstGeom prst="line">
+              <a:avLst/>
+            </a:prstGeom>
+            <a:ln w="38100" cap="rnd">
+              <a:solidFill>
+                <a:schemeClr val="tx1"/>
+              </a:solidFill>
+            </a:ln>
+          </p:spPr>
+          <p:style>
+            <a:lnRef idx="1">
+              <a:schemeClr val="accent1"/>
+            </a:lnRef>
+            <a:fillRef idx="0">
+              <a:schemeClr val="accent1"/>
+            </a:fillRef>
+            <a:effectRef idx="0">
+              <a:schemeClr val="accent1"/>
+            </a:effectRef>
+            <a:fontRef idx="minor">
+              <a:schemeClr val="tx1"/>
+            </a:fontRef>
+          </p:style>
+        </p:cxnSp>
+        <p:sp>
+          <p:nvSpPr>
+            <p:cNvPr id="10" name="Oval 9">
+              <a:extLst>
+                <a:ext uri="{FF2B5EF4-FFF2-40B4-BE49-F238E27FC236}">
+                  <a16:creationId xmlns:a16="http://schemas.microsoft.com/office/drawing/2014/main" id="{8E5AC402-0819-B449-91F1-4E71989971AF}"/>
+                </a:ext>
+              </a:extLst>
+            </p:cNvPr>
+            <p:cNvSpPr/>
+            <p:nvPr/>
+          </p:nvSpPr>
+          <p:spPr>
+            <a:xfrm>
+              <a:off x="5938475" y="2853877"/>
+              <a:ext cx="69155" cy="69155"/>
+            </a:xfrm>
+            <a:prstGeom prst="ellipse">
+              <a:avLst/>
+            </a:prstGeom>
             <a:solidFill>
               <a:schemeClr val="tx1"/>
             </a:solidFill>
-          </a:ln>
-        </p:spPr>
-        <p:style>
-          <a:lnRef idx="1">
-            <a:schemeClr val="accent1"/>
-          </a:lnRef>
-          <a:fillRef idx="0">
-            <a:schemeClr val="accent1"/>
-          </a:fillRef>
-          <a:effectRef idx="0">
-            <a:schemeClr val="accent1"/>
-          </a:effectRef>
-          <a:fontRef idx="minor">
-            <a:schemeClr val="tx1"/>
-          </a:fontRef>
-        </p:style>
-      </p:cxnSp>
-      <p:cxnSp>
-        <p:nvCxnSpPr>
-          <p:cNvPr id="8" name="Straight Connector 7">
-            <a:extLst>
-              <a:ext uri="{FF2B5EF4-FFF2-40B4-BE49-F238E27FC236}">
-                <a16:creationId xmlns:a16="http://schemas.microsoft.com/office/drawing/2014/main" id="{6CB0B600-9472-004B-A1A6-8AF6F49F5309}"/>
-              </a:ext>
-            </a:extLst>
-          </p:cNvPr>
-          <p:cNvCxnSpPr>
-            <a:cxnSpLocks/>
-          </p:cNvCxnSpPr>
-          <p:nvPr/>
-        </p:nvCxnSpPr>
-        <p:spPr>
-          <a:xfrm rot="5400000">
-            <a:off x="5108131" y="2457503"/>
-            <a:ext cx="0" cy="3543300"/>
-          </a:xfrm>
-          <a:prstGeom prst="line">
-            <a:avLst/>
-          </a:prstGeom>
-          <a:ln w="38100" cap="rnd">
+            <a:ln>
+              <a:solidFill>
+                <a:schemeClr val="tx1"/>
+              </a:solidFill>
+            </a:ln>
+          </p:spPr>
+          <p:style>
+            <a:lnRef idx="2">
+              <a:schemeClr val="accent1">
+                <a:shade val="50000"/>
+              </a:schemeClr>
+            </a:lnRef>
+            <a:fillRef idx="1">
+              <a:schemeClr val="accent1"/>
+            </a:fillRef>
+            <a:effectRef idx="0">
+              <a:schemeClr val="accent1"/>
+            </a:effectRef>
+            <a:fontRef idx="minor">
+              <a:schemeClr val="lt1"/>
+            </a:fontRef>
+          </p:style>
+          <p:txBody>
+            <a:bodyPr rtlCol="0" anchor="ctr"/>
+            <a:lstStyle/>
+            <a:p>
+              <a:pPr algn="ctr"/>
+              <a:endParaRPr lang="en-US"/>
+            </a:p>
+          </p:txBody>
+        </p:sp>
+        <p:sp>
+          <p:nvSpPr>
+            <p:cNvPr id="11" name="Oval 10">
+              <a:extLst>
+                <a:ext uri="{FF2B5EF4-FFF2-40B4-BE49-F238E27FC236}">
+                  <a16:creationId xmlns:a16="http://schemas.microsoft.com/office/drawing/2014/main" id="{BBA38E7D-B4D4-024D-8772-D8A9C395DD30}"/>
+                </a:ext>
+              </a:extLst>
+            </p:cNvPr>
+            <p:cNvSpPr/>
+            <p:nvPr/>
+          </p:nvSpPr>
+          <p:spPr>
+            <a:xfrm>
+              <a:off x="3978396" y="3129778"/>
+              <a:ext cx="69155" cy="69155"/>
+            </a:xfrm>
+            <a:prstGeom prst="ellipse">
+              <a:avLst/>
+            </a:prstGeom>
             <a:solidFill>
               <a:schemeClr val="tx1"/>
             </a:solidFill>
-          </a:ln>
-        </p:spPr>
-        <p:style>
-          <a:lnRef idx="1">
-            <a:schemeClr val="accent1"/>
-          </a:lnRef>
-          <a:fillRef idx="0">
-            <a:schemeClr val="accent1"/>
-          </a:fillRef>
-          <a:effectRef idx="0">
-            <a:schemeClr val="accent1"/>
-          </a:effectRef>
-          <a:fontRef idx="minor">
-            <a:schemeClr val="tx1"/>
-          </a:fontRef>
-        </p:style>
-      </p:cxnSp>
-      <p:sp>
-        <p:nvSpPr>
-          <p:cNvPr id="10" name="Oval 9">
-            <a:extLst>
-              <a:ext uri="{FF2B5EF4-FFF2-40B4-BE49-F238E27FC236}">
-                <a16:creationId xmlns:a16="http://schemas.microsoft.com/office/drawing/2014/main" id="{8E5AC402-0819-B449-91F1-4E71989971AF}"/>
-              </a:ext>
-            </a:extLst>
-          </p:cNvPr>
-          <p:cNvSpPr/>
-          <p:nvPr/>
-        </p:nvSpPr>
-        <p:spPr>
-          <a:xfrm>
-            <a:off x="5938475" y="2853877"/>
-            <a:ext cx="69155" cy="69155"/>
-          </a:xfrm>
-          <a:prstGeom prst="ellipse">
-            <a:avLst/>
-          </a:prstGeom>
-          <a:solidFill>
-            <a:schemeClr val="tx1"/>
-          </a:solidFill>
-          <a:ln>
+            <a:ln>
+              <a:solidFill>
+                <a:schemeClr val="tx1"/>
+              </a:solidFill>
+            </a:ln>
+          </p:spPr>
+          <p:style>
+            <a:lnRef idx="2">
+              <a:schemeClr val="accent1">
+                <a:shade val="50000"/>
+              </a:schemeClr>
+            </a:lnRef>
+            <a:fillRef idx="1">
+              <a:schemeClr val="accent1"/>
+            </a:fillRef>
+            <a:effectRef idx="0">
+              <a:schemeClr val="accent1"/>
+            </a:effectRef>
+            <a:fontRef idx="minor">
+              <a:schemeClr val="lt1"/>
+            </a:fontRef>
+          </p:style>
+          <p:txBody>
+            <a:bodyPr rtlCol="0" anchor="ctr"/>
+            <a:lstStyle/>
+            <a:p>
+              <a:pPr algn="ctr"/>
+              <a:endParaRPr lang="en-US"/>
+            </a:p>
+          </p:txBody>
+        </p:sp>
+        <p:sp>
+          <p:nvSpPr>
+            <p:cNvPr id="12" name="Oval 11">
+              <a:extLst>
+                <a:ext uri="{FF2B5EF4-FFF2-40B4-BE49-F238E27FC236}">
+                  <a16:creationId xmlns:a16="http://schemas.microsoft.com/office/drawing/2014/main" id="{2BF0E5D5-1013-274B-8F82-29EA1B130F6A}"/>
+                </a:ext>
+              </a:extLst>
+            </p:cNvPr>
+            <p:cNvSpPr/>
+            <p:nvPr/>
+          </p:nvSpPr>
+          <p:spPr>
+            <a:xfrm>
+              <a:off x="3755918" y="3784169"/>
+              <a:ext cx="69155" cy="69155"/>
+            </a:xfrm>
+            <a:prstGeom prst="ellipse">
+              <a:avLst/>
+            </a:prstGeom>
             <a:solidFill>
               <a:schemeClr val="tx1"/>
             </a:solidFill>
-          </a:ln>
-        </p:spPr>
-        <p:style>
-          <a:lnRef idx="2">
-            <a:schemeClr val="accent1">
-              <a:shade val="50000"/>
-            </a:schemeClr>
-          </a:lnRef>
-          <a:fillRef idx="1">
-            <a:schemeClr val="accent1"/>
-          </a:fillRef>
-          <a:effectRef idx="0">
-            <a:schemeClr val="accent1"/>
-          </a:effectRef>
-          <a:fontRef idx="minor">
-            <a:schemeClr val="lt1"/>
-          </a:fontRef>
-        </p:style>
-        <p:txBody>
-          <a:bodyPr rtlCol="0" anchor="ctr"/>
-          <a:lstStyle/>
-          <a:p>
-            <a:pPr algn="ctr"/>
-            <a:endParaRPr lang="en-US"/>
-          </a:p>
-        </p:txBody>
-      </p:sp>
-      <p:sp>
-        <p:nvSpPr>
-          <p:cNvPr id="11" name="Oval 10">
-            <a:extLst>
-              <a:ext uri="{FF2B5EF4-FFF2-40B4-BE49-F238E27FC236}">
-                <a16:creationId xmlns:a16="http://schemas.microsoft.com/office/drawing/2014/main" id="{BBA38E7D-B4D4-024D-8772-D8A9C395DD30}"/>
-              </a:ext>
-            </a:extLst>
-          </p:cNvPr>
-          <p:cNvSpPr/>
-          <p:nvPr/>
-        </p:nvSpPr>
-        <p:spPr>
-          <a:xfrm>
-            <a:off x="3978396" y="3129778"/>
-            <a:ext cx="69155" cy="69155"/>
-          </a:xfrm>
-          <a:prstGeom prst="ellipse">
-            <a:avLst/>
-          </a:prstGeom>
-          <a:solidFill>
-            <a:schemeClr val="tx1"/>
-          </a:solidFill>
-          <a:ln>
+            <a:ln>
+              <a:solidFill>
+                <a:schemeClr val="tx1"/>
+              </a:solidFill>
+            </a:ln>
+          </p:spPr>
+          <p:style>
+            <a:lnRef idx="2">
+              <a:schemeClr val="accent1">
+                <a:shade val="50000"/>
+              </a:schemeClr>
+            </a:lnRef>
+            <a:fillRef idx="1">
+              <a:schemeClr val="accent1"/>
+            </a:fillRef>
+            <a:effectRef idx="0">
+              <a:schemeClr val="accent1"/>
+            </a:effectRef>
+            <a:fontRef idx="minor">
+              <a:schemeClr val="lt1"/>
+            </a:fontRef>
+          </p:style>
+          <p:txBody>
+            <a:bodyPr rtlCol="0" anchor="ctr"/>
+            <a:lstStyle/>
+            <a:p>
+              <a:pPr algn="ctr"/>
+              <a:endParaRPr lang="en-US"/>
+            </a:p>
+          </p:txBody>
+        </p:sp>
+        <p:sp>
+          <p:nvSpPr>
+            <p:cNvPr id="13" name="Oval 12">
+              <a:extLst>
+                <a:ext uri="{FF2B5EF4-FFF2-40B4-BE49-F238E27FC236}">
+                  <a16:creationId xmlns:a16="http://schemas.microsoft.com/office/drawing/2014/main" id="{59A1AA96-0F15-D247-BFE4-F08C1B5570F2}"/>
+                </a:ext>
+              </a:extLst>
+            </p:cNvPr>
+            <p:cNvSpPr/>
+            <p:nvPr/>
+          </p:nvSpPr>
+          <p:spPr>
+            <a:xfrm>
+              <a:off x="4519066" y="3289503"/>
+              <a:ext cx="69155" cy="69155"/>
+            </a:xfrm>
+            <a:prstGeom prst="ellipse">
+              <a:avLst/>
+            </a:prstGeom>
             <a:solidFill>
               <a:schemeClr val="tx1"/>
             </a:solidFill>
-          </a:ln>
-        </p:spPr>
-        <p:style>
-          <a:lnRef idx="2">
-            <a:schemeClr val="accent1">
-              <a:shade val="50000"/>
-            </a:schemeClr>
-          </a:lnRef>
-          <a:fillRef idx="1">
-            <a:schemeClr val="accent1"/>
-          </a:fillRef>
-          <a:effectRef idx="0">
-            <a:schemeClr val="accent1"/>
-          </a:effectRef>
-          <a:fontRef idx="minor">
-            <a:schemeClr val="lt1"/>
-          </a:fontRef>
-        </p:style>
-        <p:txBody>
-          <a:bodyPr rtlCol="0" anchor="ctr"/>
-          <a:lstStyle/>
-          <a:p>
-            <a:pPr algn="ctr"/>
-            <a:endParaRPr lang="en-US"/>
-          </a:p>
-        </p:txBody>
-      </p:sp>
-      <p:sp>
-        <p:nvSpPr>
-          <p:cNvPr id="12" name="Oval 11">
-            <a:extLst>
-              <a:ext uri="{FF2B5EF4-FFF2-40B4-BE49-F238E27FC236}">
-                <a16:creationId xmlns:a16="http://schemas.microsoft.com/office/drawing/2014/main" id="{2BF0E5D5-1013-274B-8F82-29EA1B130F6A}"/>
-              </a:ext>
-            </a:extLst>
-          </p:cNvPr>
-          <p:cNvSpPr/>
-          <p:nvPr/>
-        </p:nvSpPr>
-        <p:spPr>
-          <a:xfrm>
-            <a:off x="3755918" y="3784169"/>
-            <a:ext cx="69155" cy="69155"/>
-          </a:xfrm>
-          <a:prstGeom prst="ellipse">
-            <a:avLst/>
-          </a:prstGeom>
-          <a:solidFill>
-            <a:schemeClr val="tx1"/>
-          </a:solidFill>
-          <a:ln>
+            <a:ln>
+              <a:solidFill>
+                <a:schemeClr val="tx1"/>
+              </a:solidFill>
+            </a:ln>
+          </p:spPr>
+          <p:style>
+            <a:lnRef idx="2">
+              <a:schemeClr val="accent1">
+                <a:shade val="50000"/>
+              </a:schemeClr>
+            </a:lnRef>
+            <a:fillRef idx="1">
+              <a:schemeClr val="accent1"/>
+            </a:fillRef>
+            <a:effectRef idx="0">
+              <a:schemeClr val="accent1"/>
+            </a:effectRef>
+            <a:fontRef idx="minor">
+              <a:schemeClr val="lt1"/>
+            </a:fontRef>
+          </p:style>
+          <p:txBody>
+            <a:bodyPr rtlCol="0" anchor="ctr"/>
+            <a:lstStyle/>
+            <a:p>
+              <a:pPr algn="ctr"/>
+              <a:endParaRPr lang="en-US"/>
+            </a:p>
+          </p:txBody>
+        </p:sp>
+        <p:sp>
+          <p:nvSpPr>
+            <p:cNvPr id="15" name="Oval 14">
+              <a:extLst>
+                <a:ext uri="{FF2B5EF4-FFF2-40B4-BE49-F238E27FC236}">
+                  <a16:creationId xmlns:a16="http://schemas.microsoft.com/office/drawing/2014/main" id="{C4E295C0-1058-BC4B-B6F9-54ECA57A9376}"/>
+                </a:ext>
+              </a:extLst>
+            </p:cNvPr>
+            <p:cNvSpPr/>
+            <p:nvPr/>
+          </p:nvSpPr>
+          <p:spPr>
+            <a:xfrm>
+              <a:off x="4654659" y="2701912"/>
+              <a:ext cx="69155" cy="69155"/>
+            </a:xfrm>
+            <a:prstGeom prst="ellipse">
+              <a:avLst/>
+            </a:prstGeom>
             <a:solidFill>
               <a:schemeClr val="tx1"/>
             </a:solidFill>
-          </a:ln>
-        </p:spPr>
-        <p:style>
-          <a:lnRef idx="2">
-            <a:schemeClr val="accent1">
-              <a:shade val="50000"/>
-            </a:schemeClr>
-          </a:lnRef>
-          <a:fillRef idx="1">
-            <a:schemeClr val="accent1"/>
-          </a:fillRef>
-          <a:effectRef idx="0">
-            <a:schemeClr val="accent1"/>
-          </a:effectRef>
-          <a:fontRef idx="minor">
-            <a:schemeClr val="lt1"/>
-          </a:fontRef>
-        </p:style>
-        <p:txBody>
-          <a:bodyPr rtlCol="0" anchor="ctr"/>
-          <a:lstStyle/>
-          <a:p>
-            <a:pPr algn="ctr"/>
-            <a:endParaRPr lang="en-US"/>
-          </a:p>
-        </p:txBody>
-      </p:sp>
-      <p:sp>
-        <p:nvSpPr>
-          <p:cNvPr id="13" name="Oval 12">
-            <a:extLst>
-              <a:ext uri="{FF2B5EF4-FFF2-40B4-BE49-F238E27FC236}">
-                <a16:creationId xmlns:a16="http://schemas.microsoft.com/office/drawing/2014/main" id="{59A1AA96-0F15-D247-BFE4-F08C1B5570F2}"/>
-              </a:ext>
-            </a:extLst>
-          </p:cNvPr>
-          <p:cNvSpPr/>
-          <p:nvPr/>
-        </p:nvSpPr>
-        <p:spPr>
-          <a:xfrm>
-            <a:off x="4519066" y="3289503"/>
-            <a:ext cx="69155" cy="69155"/>
-          </a:xfrm>
-          <a:prstGeom prst="ellipse">
-            <a:avLst/>
-          </a:prstGeom>
-          <a:solidFill>
-            <a:schemeClr val="tx1"/>
-          </a:solidFill>
-          <a:ln>
+            <a:ln>
+              <a:solidFill>
+                <a:schemeClr val="tx1"/>
+              </a:solidFill>
+            </a:ln>
+          </p:spPr>
+          <p:style>
+            <a:lnRef idx="2">
+              <a:schemeClr val="accent1">
+                <a:shade val="50000"/>
+              </a:schemeClr>
+            </a:lnRef>
+            <a:fillRef idx="1">
+              <a:schemeClr val="accent1"/>
+            </a:fillRef>
+            <a:effectRef idx="0">
+              <a:schemeClr val="accent1"/>
+            </a:effectRef>
+            <a:fontRef idx="minor">
+              <a:schemeClr val="lt1"/>
+            </a:fontRef>
+          </p:style>
+          <p:txBody>
+            <a:bodyPr rtlCol="0" anchor="ctr"/>
+            <a:lstStyle/>
+            <a:p>
+              <a:pPr algn="ctr"/>
+              <a:endParaRPr lang="en-US"/>
+            </a:p>
+          </p:txBody>
+        </p:sp>
+        <p:sp>
+          <p:nvSpPr>
+            <p:cNvPr id="16" name="Oval 15">
+              <a:extLst>
+                <a:ext uri="{FF2B5EF4-FFF2-40B4-BE49-F238E27FC236}">
+                  <a16:creationId xmlns:a16="http://schemas.microsoft.com/office/drawing/2014/main" id="{4E92758C-C5F7-B343-8497-24D26157107A}"/>
+                </a:ext>
+              </a:extLst>
+            </p:cNvPr>
+            <p:cNvSpPr/>
+            <p:nvPr/>
+          </p:nvSpPr>
+          <p:spPr>
+            <a:xfrm>
+              <a:off x="5073554" y="2853877"/>
+              <a:ext cx="69155" cy="69155"/>
+            </a:xfrm>
+            <a:prstGeom prst="ellipse">
+              <a:avLst/>
+            </a:prstGeom>
             <a:solidFill>
               <a:schemeClr val="tx1"/>
             </a:solidFill>
-          </a:ln>
-        </p:spPr>
-        <p:style>
-          <a:lnRef idx="2">
-            <a:schemeClr val="accent1">
-              <a:shade val="50000"/>
-            </a:schemeClr>
-          </a:lnRef>
-          <a:fillRef idx="1">
-            <a:schemeClr val="accent1"/>
-          </a:fillRef>
-          <a:effectRef idx="0">
-            <a:schemeClr val="accent1"/>
-          </a:effectRef>
-          <a:fontRef idx="minor">
-            <a:schemeClr val="lt1"/>
-          </a:fontRef>
-        </p:style>
-        <p:txBody>
-          <a:bodyPr rtlCol="0" anchor="ctr"/>
-          <a:lstStyle/>
-          <a:p>
-            <a:pPr algn="ctr"/>
-            <a:endParaRPr lang="en-US"/>
-          </a:p>
-        </p:txBody>
-      </p:sp>
-      <p:sp>
-        <p:nvSpPr>
-          <p:cNvPr id="15" name="Oval 14">
-            <a:extLst>
-              <a:ext uri="{FF2B5EF4-FFF2-40B4-BE49-F238E27FC236}">
-                <a16:creationId xmlns:a16="http://schemas.microsoft.com/office/drawing/2014/main" id="{C4E295C0-1058-BC4B-B6F9-54ECA57A9376}"/>
-              </a:ext>
-            </a:extLst>
-          </p:cNvPr>
-          <p:cNvSpPr/>
-          <p:nvPr/>
-        </p:nvSpPr>
-        <p:spPr>
-          <a:xfrm>
-            <a:off x="4654659" y="2701912"/>
-            <a:ext cx="69155" cy="69155"/>
-          </a:xfrm>
-          <a:prstGeom prst="ellipse">
-            <a:avLst/>
-          </a:prstGeom>
-          <a:solidFill>
-            <a:schemeClr val="tx1"/>
-          </a:solidFill>
-          <a:ln>
+            <a:ln>
+              <a:solidFill>
+                <a:schemeClr val="tx1"/>
+              </a:solidFill>
+            </a:ln>
+          </p:spPr>
+          <p:style>
+            <a:lnRef idx="2">
+              <a:schemeClr val="accent1">
+                <a:shade val="50000"/>
+              </a:schemeClr>
+            </a:lnRef>
+            <a:fillRef idx="1">
+              <a:schemeClr val="accent1"/>
+            </a:fillRef>
+            <a:effectRef idx="0">
+              <a:schemeClr val="accent1"/>
+            </a:effectRef>
+            <a:fontRef idx="minor">
+              <a:schemeClr val="lt1"/>
+            </a:fontRef>
+          </p:style>
+          <p:txBody>
+            <a:bodyPr rtlCol="0" anchor="ctr"/>
+            <a:lstStyle/>
+            <a:p>
+              <a:pPr algn="ctr"/>
+              <a:endParaRPr lang="en-US"/>
+            </a:p>
+          </p:txBody>
+        </p:sp>
+        <p:sp>
+          <p:nvSpPr>
+            <p:cNvPr id="17" name="Oval 16">
+              <a:extLst>
+                <a:ext uri="{FF2B5EF4-FFF2-40B4-BE49-F238E27FC236}">
+                  <a16:creationId xmlns:a16="http://schemas.microsoft.com/office/drawing/2014/main" id="{DCA74875-6D2F-014C-AC43-394A1B38D56D}"/>
+                </a:ext>
+              </a:extLst>
+            </p:cNvPr>
+            <p:cNvSpPr/>
+            <p:nvPr/>
+          </p:nvSpPr>
+          <p:spPr>
+            <a:xfrm>
+              <a:off x="5500269" y="2563412"/>
+              <a:ext cx="69155" cy="69155"/>
+            </a:xfrm>
+            <a:prstGeom prst="ellipse">
+              <a:avLst/>
+            </a:prstGeom>
             <a:solidFill>
               <a:schemeClr val="tx1"/>
             </a:solidFill>
-          </a:ln>
-        </p:spPr>
-        <p:style>
-          <a:lnRef idx="2">
-            <a:schemeClr val="accent1">
-              <a:shade val="50000"/>
-            </a:schemeClr>
-          </a:lnRef>
-          <a:fillRef idx="1">
-            <a:schemeClr val="accent1"/>
-          </a:fillRef>
-          <a:effectRef idx="0">
-            <a:schemeClr val="accent1"/>
-          </a:effectRef>
-          <a:fontRef idx="minor">
-            <a:schemeClr val="lt1"/>
-          </a:fontRef>
-        </p:style>
-        <p:txBody>
-          <a:bodyPr rtlCol="0" anchor="ctr"/>
-          <a:lstStyle/>
-          <a:p>
-            <a:pPr algn="ctr"/>
-            <a:endParaRPr lang="en-US"/>
-          </a:p>
-        </p:txBody>
-      </p:sp>
-      <p:sp>
-        <p:nvSpPr>
-          <p:cNvPr id="16" name="Oval 15">
-            <a:extLst>
-              <a:ext uri="{FF2B5EF4-FFF2-40B4-BE49-F238E27FC236}">
-                <a16:creationId xmlns:a16="http://schemas.microsoft.com/office/drawing/2014/main" id="{4E92758C-C5F7-B343-8497-24D26157107A}"/>
-              </a:ext>
-            </a:extLst>
-          </p:cNvPr>
-          <p:cNvSpPr/>
-          <p:nvPr/>
-        </p:nvSpPr>
-        <p:spPr>
-          <a:xfrm>
-            <a:off x="5073554" y="2853877"/>
-            <a:ext cx="69155" cy="69155"/>
-          </a:xfrm>
-          <a:prstGeom prst="ellipse">
-            <a:avLst/>
-          </a:prstGeom>
-          <a:solidFill>
-            <a:schemeClr val="tx1"/>
-          </a:solidFill>
-          <a:ln>
-            <a:solidFill>
+            <a:ln>
+              <a:solidFill>
+                <a:schemeClr val="tx1"/>
+              </a:solidFill>
+            </a:ln>
+          </p:spPr>
+          <p:style>
+            <a:lnRef idx="2">
+              <a:schemeClr val="accent1">
+                <a:shade val="50000"/>
+              </a:schemeClr>
+            </a:lnRef>
+            <a:fillRef idx="1">
+              <a:schemeClr val="accent1"/>
+            </a:fillRef>
+            <a:effectRef idx="0">
+              <a:schemeClr val="accent1"/>
+            </a:effectRef>
+            <a:fontRef idx="minor">
+              <a:schemeClr val="lt1"/>
+            </a:fontRef>
+          </p:style>
+          <p:txBody>
+            <a:bodyPr rtlCol="0" anchor="ctr"/>
+            <a:lstStyle/>
+            <a:p>
+              <a:pPr algn="ctr"/>
+              <a:endParaRPr lang="en-US"/>
+            </a:p>
+          </p:txBody>
+        </p:sp>
+        <mc:AlternateContent xmlns:mc="http://schemas.openxmlformats.org/markup-compatibility/2006">
+          <mc:Choice xmlns:a14="http://schemas.microsoft.com/office/drawing/2010/main" Requires="a14">
+            <p:sp>
+              <p:nvSpPr>
+                <p:cNvPr id="39" name="TextBox 38">
+                  <a:extLst>
+                    <a:ext uri="{FF2B5EF4-FFF2-40B4-BE49-F238E27FC236}">
+                      <a16:creationId xmlns:a16="http://schemas.microsoft.com/office/drawing/2014/main" id="{85473D4C-17BE-2048-B483-DFD1EA862F47}"/>
+                    </a:ext>
+                  </a:extLst>
+                </p:cNvPr>
+                <p:cNvSpPr txBox="1"/>
+                <p:nvPr/>
+              </p:nvSpPr>
+              <p:spPr>
+                <a:xfrm>
+                  <a:off x="2986223" y="2679717"/>
+                  <a:ext cx="186718" cy="276999"/>
+                </a:xfrm>
+                <a:prstGeom prst="rect">
+                  <a:avLst/>
+                </a:prstGeom>
+                <a:noFill/>
+              </p:spPr>
+              <p:txBody>
+                <a:bodyPr wrap="none" lIns="0" tIns="0" rIns="0" bIns="0" rtlCol="0">
+                  <a:spAutoFit/>
+                </a:bodyPr>
+                <a:lstStyle/>
+                <a:p>
+                  <a14:m>
+                    <m:oMathPara xmlns:m="http://schemas.openxmlformats.org/officeDocument/2006/math">
+                      <m:oMathParaPr>
+                        <m:jc m:val="centerGroup"/>
+                      </m:oMathParaPr>
+                      <m:oMath xmlns:m="http://schemas.openxmlformats.org/officeDocument/2006/math">
+                        <m:r>
+                          <a:rPr lang="en-US" b="0" i="1">
+                            <a:latin typeface="Cambria Math" panose="02040503050406030204" pitchFamily="18" charset="0"/>
+                          </a:rPr>
+                          <m:t>𝑦</m:t>
+                        </m:r>
+                      </m:oMath>
+                    </m:oMathPara>
+                  </a14:m>
+                  <a:endParaRPr lang="en-US"/>
+                </a:p>
+              </p:txBody>
+            </p:sp>
+          </mc:Choice>
+          <mc:Fallback>
+            <p:sp>
+              <p:nvSpPr>
+                <p:cNvPr id="39" name="TextBox 38">
+                  <a:extLst>
+                    <a:ext uri="{FF2B5EF4-FFF2-40B4-BE49-F238E27FC236}">
+                      <a16:creationId xmlns:a16="http://schemas.microsoft.com/office/drawing/2014/main" id="{85473D4C-17BE-2048-B483-DFD1EA862F47}"/>
+                    </a:ext>
+                  </a:extLst>
+                </p:cNvPr>
+                <p:cNvSpPr txBox="1">
+                  <a:spLocks noRot="1" noChangeAspect="1" noMove="1" noResize="1" noEditPoints="1" noAdjustHandles="1" noChangeArrowheads="1" noChangeShapeType="1" noTextEdit="1"/>
+                </p:cNvSpPr>
+                <p:nvPr/>
+              </p:nvSpPr>
+              <p:spPr>
+                <a:xfrm>
+                  <a:off x="2986223" y="2679717"/>
+                  <a:ext cx="186718" cy="276999"/>
+                </a:xfrm>
+                <a:prstGeom prst="rect">
+                  <a:avLst/>
+                </a:prstGeom>
+                <a:blipFill>
+                  <a:blip r:embed="rId2"/>
+                  <a:stretch>
+                    <a:fillRect l="-33333" r="-26667" b="-27273"/>
+                  </a:stretch>
+                </a:blipFill>
+              </p:spPr>
+              <p:txBody>
+                <a:bodyPr/>
+                <a:lstStyle/>
+                <a:p>
+                  <a:r>
+                    <a:rPr lang="en-US">
+                      <a:noFill/>
+                    </a:rPr>
+                    <a:t> </a:t>
+                  </a:r>
+                </a:p>
+              </p:txBody>
+            </p:sp>
+          </mc:Fallback>
+        </mc:AlternateContent>
+        <mc:AlternateContent xmlns:mc="http://schemas.openxmlformats.org/markup-compatibility/2006">
+          <mc:Choice xmlns:a14="http://schemas.microsoft.com/office/drawing/2010/main" Requires="a14">
+            <p:sp>
+              <p:nvSpPr>
+                <p:cNvPr id="40" name="TextBox 39">
+                  <a:extLst>
+                    <a:ext uri="{FF2B5EF4-FFF2-40B4-BE49-F238E27FC236}">
+                      <a16:creationId xmlns:a16="http://schemas.microsoft.com/office/drawing/2014/main" id="{55E01F25-68ED-4F45-BBD1-2300266BFD46}"/>
+                    </a:ext>
+                  </a:extLst>
+                </p:cNvPr>
+                <p:cNvSpPr txBox="1"/>
+                <p:nvPr/>
+              </p:nvSpPr>
+              <p:spPr>
+                <a:xfrm>
+                  <a:off x="5033174" y="4347949"/>
+                  <a:ext cx="149913" cy="276999"/>
+                </a:xfrm>
+                <a:prstGeom prst="rect">
+                  <a:avLst/>
+                </a:prstGeom>
+                <a:noFill/>
+              </p:spPr>
+              <p:txBody>
+                <a:bodyPr wrap="none" lIns="0" tIns="0" rIns="0" bIns="0" rtlCol="0">
+                  <a:spAutoFit/>
+                </a:bodyPr>
+                <a:lstStyle/>
+                <a:p>
+                  <a14:m>
+                    <m:oMathPara xmlns:m="http://schemas.openxmlformats.org/officeDocument/2006/math">
+                      <m:oMathParaPr>
+                        <m:jc m:val="centerGroup"/>
+                      </m:oMathParaPr>
+                      <m:oMath xmlns:m="http://schemas.openxmlformats.org/officeDocument/2006/math">
+                        <m:r>
+                          <a:rPr lang="en-US" b="0" i="1">
+                            <a:latin typeface="Cambria Math" panose="02040503050406030204" pitchFamily="18" charset="0"/>
+                          </a:rPr>
+                          <m:t>𝑡</m:t>
+                        </m:r>
+                      </m:oMath>
+                    </m:oMathPara>
+                  </a14:m>
+                  <a:endParaRPr lang="en-US"/>
+                </a:p>
+              </p:txBody>
+            </p:sp>
+          </mc:Choice>
+          <mc:Fallback>
+            <p:sp>
+              <p:nvSpPr>
+                <p:cNvPr id="40" name="TextBox 39">
+                  <a:extLst>
+                    <a:ext uri="{FF2B5EF4-FFF2-40B4-BE49-F238E27FC236}">
+                      <a16:creationId xmlns:a16="http://schemas.microsoft.com/office/drawing/2014/main" id="{55E01F25-68ED-4F45-BBD1-2300266BFD46}"/>
+                    </a:ext>
+                  </a:extLst>
+                </p:cNvPr>
+                <p:cNvSpPr txBox="1">
+                  <a:spLocks noRot="1" noChangeAspect="1" noMove="1" noResize="1" noEditPoints="1" noAdjustHandles="1" noChangeArrowheads="1" noChangeShapeType="1" noTextEdit="1"/>
+                </p:cNvSpPr>
+                <p:nvPr/>
+              </p:nvSpPr>
+              <p:spPr>
+                <a:xfrm>
+                  <a:off x="5033174" y="4347949"/>
+                  <a:ext cx="149913" cy="276999"/>
+                </a:xfrm>
+                <a:prstGeom prst="rect">
+                  <a:avLst/>
+                </a:prstGeom>
+                <a:blipFill>
+                  <a:blip r:embed="rId3"/>
+                  <a:stretch>
+                    <a:fillRect l="-30769" r="-23077" b="-4348"/>
+                  </a:stretch>
+                </a:blipFill>
+              </p:spPr>
+              <p:txBody>
+                <a:bodyPr/>
+                <a:lstStyle/>
+                <a:p>
+                  <a:r>
+                    <a:rPr lang="en-US">
+                      <a:noFill/>
+                    </a:rPr>
+                    <a:t> </a:t>
+                  </a:r>
+                </a:p>
+              </p:txBody>
+            </p:sp>
+          </mc:Fallback>
+        </mc:AlternateContent>
+        <p:sp>
+          <p:nvSpPr>
+            <p:cNvPr id="42" name="TextBox 41">
+              <a:extLst>
+                <a:ext uri="{FF2B5EF4-FFF2-40B4-BE49-F238E27FC236}">
+                  <a16:creationId xmlns:a16="http://schemas.microsoft.com/office/drawing/2014/main" id="{54D7190D-D4FA-3D48-BE33-C3D5F5EC0F6F}"/>
+                </a:ext>
+              </a:extLst>
+            </p:cNvPr>
+            <p:cNvSpPr txBox="1"/>
+            <p:nvPr/>
+          </p:nvSpPr>
+          <p:spPr>
+            <a:xfrm>
+              <a:off x="3361923" y="1196188"/>
+              <a:ext cx="3342502" cy="369332"/>
+            </a:xfrm>
+            <a:prstGeom prst="rect">
+              <a:avLst/>
+            </a:prstGeom>
+            <a:noFill/>
+          </p:spPr>
+          <p:txBody>
+            <a:bodyPr wrap="square" rtlCol="0">
+              <a:spAutoFit/>
+            </a:bodyPr>
+            <a:lstStyle/>
+            <a:p>
+              <a:pPr algn="ctr"/>
+              <a:r>
+                <a:rPr lang="en-US"/>
+                <a:t>Idealized oxygen utilization curve</a:t>
+              </a:r>
+            </a:p>
+          </p:txBody>
+        </p:sp>
+        <p:sp>
+          <p:nvSpPr>
+            <p:cNvPr id="6" name="Freeform 5">
+              <a:extLst>
+                <a:ext uri="{FF2B5EF4-FFF2-40B4-BE49-F238E27FC236}">
+                  <a16:creationId xmlns:a16="http://schemas.microsoft.com/office/drawing/2014/main" id="{874C4527-1CFB-8E4A-B6CB-943BFD3F18F0}"/>
+                </a:ext>
+              </a:extLst>
+            </p:cNvPr>
+            <p:cNvSpPr/>
+            <p:nvPr/>
+          </p:nvSpPr>
+          <p:spPr>
+            <a:xfrm>
+              <a:off x="3329796" y="2679717"/>
+              <a:ext cx="3342502" cy="1555853"/>
+            </a:xfrm>
+            <a:custGeom>
+              <a:avLst/>
+              <a:gdLst>
+                <a:gd name="connsiteX0" fmla="*/ 0 w 3571336"/>
+                <a:gd name="connsiteY0" fmla="*/ 1555853 h 1555853"/>
+                <a:gd name="connsiteX1" fmla="*/ 1483744 w 3571336"/>
+                <a:gd name="connsiteY1" fmla="*/ 244638 h 1555853"/>
+                <a:gd name="connsiteX2" fmla="*/ 3571336 w 3571336"/>
+                <a:gd name="connsiteY2" fmla="*/ 3098 h 1555853"/>
+              </a:gdLst>
+              <a:ahLst/>
+              <a:cxnLst>
+                <a:cxn ang="0">
+                  <a:pos x="connsiteX0" y="connsiteY0"/>
+                </a:cxn>
+                <a:cxn ang="0">
+                  <a:pos x="connsiteX1" y="connsiteY1"/>
+                </a:cxn>
+                <a:cxn ang="0">
+                  <a:pos x="connsiteX2" y="connsiteY2"/>
+                </a:cxn>
+              </a:cxnLst>
+              <a:rect l="l" t="t" r="r" b="b"/>
+              <a:pathLst>
+                <a:path w="3571336" h="1555853">
+                  <a:moveTo>
+                    <a:pt x="0" y="1555853"/>
+                  </a:moveTo>
+                  <a:cubicBezTo>
+                    <a:pt x="444260" y="1029641"/>
+                    <a:pt x="888521" y="503430"/>
+                    <a:pt x="1483744" y="244638"/>
+                  </a:cubicBezTo>
+                  <a:cubicBezTo>
+                    <a:pt x="2078967" y="-14154"/>
+                    <a:pt x="2825151" y="-5528"/>
+                    <a:pt x="3571336" y="3098"/>
+                  </a:cubicBezTo>
+                </a:path>
+              </a:pathLst>
+            </a:custGeom>
+            <a:noFill/>
+            <a:ln w="38100">
+              <a:solidFill>
+                <a:schemeClr val="tx1"/>
+              </a:solidFill>
+              <a:prstDash val="solid"/>
+            </a:ln>
+          </p:spPr>
+          <p:style>
+            <a:lnRef idx="2">
+              <a:schemeClr val="accent1">
+                <a:shade val="50000"/>
+              </a:schemeClr>
+            </a:lnRef>
+            <a:fillRef idx="1">
+              <a:schemeClr val="accent1"/>
+            </a:fillRef>
+            <a:effectRef idx="0">
+              <a:schemeClr val="accent1"/>
+            </a:effectRef>
+            <a:fontRef idx="minor">
+              <a:schemeClr val="lt1"/>
+            </a:fontRef>
+          </p:style>
+          <p:txBody>
+            <a:bodyPr rtlCol="0" anchor="ctr"/>
+            <a:lstStyle/>
+            <a:p>
+              <a:pPr algn="ctr"/>
+              <a:endParaRPr lang="en-US"/>
+            </a:p>
+          </p:txBody>
+        </p:sp>
+        <p:cxnSp>
+          <p:nvCxnSpPr>
+            <p:cNvPr id="9" name="Straight Connector 8">
+              <a:extLst>
+                <a:ext uri="{FF2B5EF4-FFF2-40B4-BE49-F238E27FC236}">
+                  <a16:creationId xmlns:a16="http://schemas.microsoft.com/office/drawing/2014/main" id="{52BC8ACA-E777-6841-B9AF-8C674987525C}"/>
+                </a:ext>
+              </a:extLst>
+            </p:cNvPr>
+            <p:cNvCxnSpPr>
+              <a:cxnSpLocks/>
+              <a:stCxn id="12" idx="0"/>
+              <a:endCxn id="11" idx="3"/>
+            </p:cNvCxnSpPr>
+            <p:nvPr/>
+          </p:nvCxnSpPr>
+          <p:spPr>
+            <a:xfrm flipV="1">
+              <a:off x="3790496" y="3188805"/>
+              <a:ext cx="198028" cy="595364"/>
+            </a:xfrm>
+            <a:prstGeom prst="line">
+              <a:avLst/>
+            </a:prstGeom>
+            <a:ln>
+              <a:solidFill>
+                <a:schemeClr val="tx1"/>
+              </a:solidFill>
+              <a:prstDash val="dash"/>
+            </a:ln>
+          </p:spPr>
+          <p:style>
+            <a:lnRef idx="1">
+              <a:schemeClr val="accent1"/>
+            </a:lnRef>
+            <a:fillRef idx="0">
+              <a:schemeClr val="accent1"/>
+            </a:fillRef>
+            <a:effectRef idx="0">
+              <a:schemeClr val="accent1"/>
+            </a:effectRef>
+            <a:fontRef idx="minor">
               <a:schemeClr val="tx1"/>
-            </a:solidFill>
-          </a:ln>
-        </p:spPr>
-        <p:style>
-          <a:lnRef idx="2">
-            <a:schemeClr val="accent1">
-              <a:shade val="50000"/>
-            </a:schemeClr>
-          </a:lnRef>
-          <a:fillRef idx="1">
-            <a:schemeClr val="accent1"/>
-          </a:fillRef>
-          <a:effectRef idx="0">
-            <a:schemeClr val="accent1"/>
-          </a:effectRef>
-          <a:fontRef idx="minor">
-            <a:schemeClr val="lt1"/>
-          </a:fontRef>
-        </p:style>
-        <p:txBody>
-          <a:bodyPr rtlCol="0" anchor="ctr"/>
-          <a:lstStyle/>
-          <a:p>
-            <a:pPr algn="ctr"/>
-            <a:endParaRPr lang="en-US"/>
-          </a:p>
-        </p:txBody>
-      </p:sp>
-      <p:sp>
-        <p:nvSpPr>
-          <p:cNvPr id="17" name="Oval 16">
-            <a:extLst>
-              <a:ext uri="{FF2B5EF4-FFF2-40B4-BE49-F238E27FC236}">
-                <a16:creationId xmlns:a16="http://schemas.microsoft.com/office/drawing/2014/main" id="{DCA74875-6D2F-014C-AC43-394A1B38D56D}"/>
-              </a:ext>
-            </a:extLst>
-          </p:cNvPr>
-          <p:cNvSpPr/>
-          <p:nvPr/>
-        </p:nvSpPr>
-        <p:spPr>
-          <a:xfrm>
-            <a:off x="5500269" y="2563412"/>
-            <a:ext cx="69155" cy="69155"/>
-          </a:xfrm>
-          <a:prstGeom prst="ellipse">
-            <a:avLst/>
-          </a:prstGeom>
-          <a:solidFill>
-            <a:schemeClr val="tx1"/>
-          </a:solidFill>
-          <a:ln>
-            <a:solidFill>
+            </a:fontRef>
+          </p:style>
+        </p:cxnSp>
+        <p:cxnSp>
+          <p:nvCxnSpPr>
+            <p:cNvPr id="35" name="Straight Connector 34">
+              <a:extLst>
+                <a:ext uri="{FF2B5EF4-FFF2-40B4-BE49-F238E27FC236}">
+                  <a16:creationId xmlns:a16="http://schemas.microsoft.com/office/drawing/2014/main" id="{651702C8-5FEB-3F4F-8909-81C03297064E}"/>
+                </a:ext>
+              </a:extLst>
+            </p:cNvPr>
+            <p:cNvCxnSpPr>
+              <a:cxnSpLocks/>
+              <a:stCxn id="13" idx="2"/>
+              <a:endCxn id="11" idx="6"/>
+            </p:cNvCxnSpPr>
+            <p:nvPr/>
+          </p:nvCxnSpPr>
+          <p:spPr>
+            <a:xfrm flipH="1" flipV="1">
+              <a:off x="4047551" y="3164356"/>
+              <a:ext cx="471515" cy="159725"/>
+            </a:xfrm>
+            <a:prstGeom prst="line">
+              <a:avLst/>
+            </a:prstGeom>
+            <a:ln>
+              <a:solidFill>
+                <a:schemeClr val="tx1"/>
+              </a:solidFill>
+              <a:prstDash val="dash"/>
+            </a:ln>
+          </p:spPr>
+          <p:style>
+            <a:lnRef idx="1">
+              <a:schemeClr val="accent1"/>
+            </a:lnRef>
+            <a:fillRef idx="0">
+              <a:schemeClr val="accent1"/>
+            </a:fillRef>
+            <a:effectRef idx="0">
+              <a:schemeClr val="accent1"/>
+            </a:effectRef>
+            <a:fontRef idx="minor">
               <a:schemeClr val="tx1"/>
-            </a:solidFill>
-          </a:ln>
-        </p:spPr>
-        <p:style>
-          <a:lnRef idx="2">
-            <a:schemeClr val="accent1">
-              <a:shade val="50000"/>
-            </a:schemeClr>
-          </a:lnRef>
-          <a:fillRef idx="1">
-            <a:schemeClr val="accent1"/>
-          </a:fillRef>
-          <a:effectRef idx="0">
-            <a:schemeClr val="accent1"/>
-          </a:effectRef>
-          <a:fontRef idx="minor">
-            <a:schemeClr val="lt1"/>
-          </a:fontRef>
-        </p:style>
-        <p:txBody>
-          <a:bodyPr rtlCol="0" anchor="ctr"/>
-          <a:lstStyle/>
-          <a:p>
-            <a:pPr algn="ctr"/>
-            <a:endParaRPr lang="en-US"/>
-          </a:p>
-        </p:txBody>
-      </p:sp>
-      <mc:AlternateContent xmlns:mc="http://schemas.openxmlformats.org/markup-compatibility/2006">
-        <mc:Choice xmlns:a14="http://schemas.microsoft.com/office/drawing/2010/main" Requires="a14">
-          <p:sp>
-            <p:nvSpPr>
-              <p:cNvPr id="39" name="TextBox 38">
-                <a:extLst>
-                  <a:ext uri="{FF2B5EF4-FFF2-40B4-BE49-F238E27FC236}">
-                    <a16:creationId xmlns:a16="http://schemas.microsoft.com/office/drawing/2014/main" id="{85473D4C-17BE-2048-B483-DFD1EA862F47}"/>
-                  </a:ext>
-                </a:extLst>
-              </p:cNvPr>
-              <p:cNvSpPr txBox="1"/>
-              <p:nvPr/>
-            </p:nvSpPr>
-            <p:spPr>
-              <a:xfrm>
-                <a:off x="2987111" y="2424913"/>
-                <a:ext cx="186718" cy="276999"/>
-              </a:xfrm>
-              <a:prstGeom prst="rect">
-                <a:avLst/>
-              </a:prstGeom>
-              <a:noFill/>
-            </p:spPr>
-            <p:txBody>
-              <a:bodyPr wrap="none" lIns="0" tIns="0" rIns="0" bIns="0" rtlCol="0">
-                <a:spAutoFit/>
-              </a:bodyPr>
-              <a:lstStyle/>
-              <a:p>
-                <a14:m>
-                  <m:oMathPara xmlns:m="http://schemas.openxmlformats.org/officeDocument/2006/math">
-                    <m:oMathParaPr>
-                      <m:jc m:val="centerGroup"/>
-                    </m:oMathParaPr>
-                    <m:oMath xmlns:m="http://schemas.openxmlformats.org/officeDocument/2006/math">
-                      <m:r>
-                        <a:rPr lang="en-US" b="0" i="1">
-                          <a:latin typeface="Cambria Math" panose="02040503050406030204" pitchFamily="18" charset="0"/>
-                        </a:rPr>
-                        <m:t>𝑦</m:t>
-                      </m:r>
-                    </m:oMath>
-                  </m:oMathPara>
-                </a14:m>
-                <a:endParaRPr lang="en-US"/>
-              </a:p>
-            </p:txBody>
-          </p:sp>
-        </mc:Choice>
-        <mc:Fallback>
-          <p:sp>
-            <p:nvSpPr>
-              <p:cNvPr id="39" name="TextBox 38">
-                <a:extLst>
-                  <a:ext uri="{FF2B5EF4-FFF2-40B4-BE49-F238E27FC236}">
-                    <a16:creationId xmlns:a16="http://schemas.microsoft.com/office/drawing/2014/main" id="{85473D4C-17BE-2048-B483-DFD1EA862F47}"/>
-                  </a:ext>
-                </a:extLst>
-              </p:cNvPr>
-              <p:cNvSpPr txBox="1">
-                <a:spLocks noRot="1" noChangeAspect="1" noMove="1" noResize="1" noEditPoints="1" noAdjustHandles="1" noChangeArrowheads="1" noChangeShapeType="1" noTextEdit="1"/>
-              </p:cNvSpPr>
-              <p:nvPr/>
-            </p:nvSpPr>
-            <p:spPr>
-              <a:xfrm>
-                <a:off x="2987111" y="2424913"/>
-                <a:ext cx="186718" cy="276999"/>
-              </a:xfrm>
-              <a:prstGeom prst="rect">
-                <a:avLst/>
-              </a:prstGeom>
-              <a:blipFill>
-                <a:blip r:embed="rId2"/>
-                <a:stretch>
-                  <a:fillRect l="-31250" r="-25000" b="-27273"/>
-                </a:stretch>
-              </a:blipFill>
-            </p:spPr>
-            <p:txBody>
-              <a:bodyPr/>
-              <a:lstStyle/>
-              <a:p>
-                <a:r>
-                  <a:rPr lang="en-US">
-                    <a:noFill/>
-                  </a:rPr>
-                  <a:t> </a:t>
-                </a:r>
-              </a:p>
-            </p:txBody>
-          </p:sp>
-        </mc:Fallback>
-      </mc:AlternateContent>
-      <mc:AlternateContent xmlns:mc="http://schemas.openxmlformats.org/markup-compatibility/2006">
-        <mc:Choice xmlns:a14="http://schemas.microsoft.com/office/drawing/2010/main" Requires="a14">
-          <p:sp>
-            <p:nvSpPr>
-              <p:cNvPr id="40" name="TextBox 39">
-                <a:extLst>
-                  <a:ext uri="{FF2B5EF4-FFF2-40B4-BE49-F238E27FC236}">
-                    <a16:creationId xmlns:a16="http://schemas.microsoft.com/office/drawing/2014/main" id="{55E01F25-68ED-4F45-BBD1-2300266BFD46}"/>
-                  </a:ext>
-                </a:extLst>
-              </p:cNvPr>
-              <p:cNvSpPr txBox="1"/>
-              <p:nvPr/>
-            </p:nvSpPr>
-            <p:spPr>
-              <a:xfrm>
-                <a:off x="5033174" y="4347949"/>
-                <a:ext cx="149913" cy="276999"/>
-              </a:xfrm>
-              <a:prstGeom prst="rect">
-                <a:avLst/>
-              </a:prstGeom>
-              <a:noFill/>
-            </p:spPr>
-            <p:txBody>
-              <a:bodyPr wrap="none" lIns="0" tIns="0" rIns="0" bIns="0" rtlCol="0">
-                <a:spAutoFit/>
-              </a:bodyPr>
-              <a:lstStyle/>
-              <a:p>
-                <a14:m>
-                  <m:oMathPara xmlns:m="http://schemas.openxmlformats.org/officeDocument/2006/math">
-                    <m:oMathParaPr>
-                      <m:jc m:val="centerGroup"/>
-                    </m:oMathParaPr>
-                    <m:oMath xmlns:m="http://schemas.openxmlformats.org/officeDocument/2006/math">
-                      <m:r>
-                        <a:rPr lang="en-US" b="0" i="1">
-                          <a:latin typeface="Cambria Math" panose="02040503050406030204" pitchFamily="18" charset="0"/>
-                        </a:rPr>
-                        <m:t>𝑡</m:t>
-                      </m:r>
-                    </m:oMath>
-                  </m:oMathPara>
-                </a14:m>
-                <a:endParaRPr lang="en-US"/>
-              </a:p>
-            </p:txBody>
-          </p:sp>
-        </mc:Choice>
-        <mc:Fallback>
-          <p:sp>
-            <p:nvSpPr>
-              <p:cNvPr id="40" name="TextBox 39">
-                <a:extLst>
-                  <a:ext uri="{FF2B5EF4-FFF2-40B4-BE49-F238E27FC236}">
-                    <a16:creationId xmlns:a16="http://schemas.microsoft.com/office/drawing/2014/main" id="{55E01F25-68ED-4F45-BBD1-2300266BFD46}"/>
-                  </a:ext>
-                </a:extLst>
-              </p:cNvPr>
-              <p:cNvSpPr txBox="1">
-                <a:spLocks noRot="1" noChangeAspect="1" noMove="1" noResize="1" noEditPoints="1" noAdjustHandles="1" noChangeArrowheads="1" noChangeShapeType="1" noTextEdit="1"/>
-              </p:cNvSpPr>
-              <p:nvPr/>
-            </p:nvSpPr>
-            <p:spPr>
-              <a:xfrm>
-                <a:off x="5033174" y="4347949"/>
-                <a:ext cx="149913" cy="276999"/>
-              </a:xfrm>
-              <a:prstGeom prst="rect">
-                <a:avLst/>
-              </a:prstGeom>
-              <a:blipFill>
-                <a:blip r:embed="rId3"/>
-                <a:stretch>
-                  <a:fillRect l="-30769" r="-23077" b="-4348"/>
-                </a:stretch>
-              </a:blipFill>
-            </p:spPr>
-            <p:txBody>
-              <a:bodyPr/>
-              <a:lstStyle/>
-              <a:p>
-                <a:r>
-                  <a:rPr lang="en-US">
-                    <a:noFill/>
-                  </a:rPr>
-                  <a:t> </a:t>
-                </a:r>
-              </a:p>
-            </p:txBody>
-          </p:sp>
-        </mc:Fallback>
-      </mc:AlternateContent>
-      <p:sp>
-        <p:nvSpPr>
-          <p:cNvPr id="42" name="TextBox 41">
-            <a:extLst>
-              <a:ext uri="{FF2B5EF4-FFF2-40B4-BE49-F238E27FC236}">
-                <a16:creationId xmlns:a16="http://schemas.microsoft.com/office/drawing/2014/main" id="{54D7190D-D4FA-3D48-BE33-C3D5F5EC0F6F}"/>
-              </a:ext>
-            </a:extLst>
-          </p:cNvPr>
-          <p:cNvSpPr txBox="1"/>
-          <p:nvPr/>
-        </p:nvSpPr>
-        <p:spPr>
-          <a:xfrm>
-            <a:off x="3685852" y="1188930"/>
-            <a:ext cx="2694644" cy="646331"/>
-          </a:xfrm>
-          <a:prstGeom prst="rect">
-            <a:avLst/>
-          </a:prstGeom>
-          <a:noFill/>
-        </p:spPr>
-        <p:txBody>
-          <a:bodyPr wrap="square" rtlCol="0">
-            <a:spAutoFit/>
-          </a:bodyPr>
-          <a:lstStyle/>
-          <a:p>
-            <a:pPr algn="ctr"/>
-            <a:r>
-              <a:rPr lang="en-US"/>
-              <a:t>Idealized oxygen utilization curve</a:t>
-            </a:r>
-          </a:p>
-        </p:txBody>
-      </p:sp>
-      <p:sp>
-        <p:nvSpPr>
-          <p:cNvPr id="6" name="Freeform 5">
-            <a:extLst>
-              <a:ext uri="{FF2B5EF4-FFF2-40B4-BE49-F238E27FC236}">
-                <a16:creationId xmlns:a16="http://schemas.microsoft.com/office/drawing/2014/main" id="{874C4527-1CFB-8E4A-B6CB-943BFD3F18F0}"/>
-              </a:ext>
-            </a:extLst>
-          </p:cNvPr>
-          <p:cNvSpPr/>
-          <p:nvPr/>
-        </p:nvSpPr>
-        <p:spPr>
-          <a:xfrm>
-            <a:off x="3329796" y="2679717"/>
-            <a:ext cx="3342502" cy="1555853"/>
-          </a:xfrm>
-          <a:custGeom>
-            <a:avLst/>
-            <a:gdLst>
-              <a:gd name="connsiteX0" fmla="*/ 0 w 3571336"/>
-              <a:gd name="connsiteY0" fmla="*/ 1555853 h 1555853"/>
-              <a:gd name="connsiteX1" fmla="*/ 1483744 w 3571336"/>
-              <a:gd name="connsiteY1" fmla="*/ 244638 h 1555853"/>
-              <a:gd name="connsiteX2" fmla="*/ 3571336 w 3571336"/>
-              <a:gd name="connsiteY2" fmla="*/ 3098 h 1555853"/>
-            </a:gdLst>
-            <a:ahLst/>
-            <a:cxnLst>
-              <a:cxn ang="0">
-                <a:pos x="connsiteX0" y="connsiteY0"/>
-              </a:cxn>
-              <a:cxn ang="0">
-                <a:pos x="connsiteX1" y="connsiteY1"/>
-              </a:cxn>
-              <a:cxn ang="0">
-                <a:pos x="connsiteX2" y="connsiteY2"/>
-              </a:cxn>
-            </a:cxnLst>
-            <a:rect l="l" t="t" r="r" b="b"/>
-            <a:pathLst>
-              <a:path w="3571336" h="1555853">
-                <a:moveTo>
-                  <a:pt x="0" y="1555853"/>
-                </a:moveTo>
-                <a:cubicBezTo>
-                  <a:pt x="444260" y="1029641"/>
-                  <a:pt x="888521" y="503430"/>
-                  <a:pt x="1483744" y="244638"/>
-                </a:cubicBezTo>
-                <a:cubicBezTo>
-                  <a:pt x="2078967" y="-14154"/>
-                  <a:pt x="2825151" y="-5528"/>
-                  <a:pt x="3571336" y="3098"/>
-                </a:cubicBezTo>
-              </a:path>
-            </a:pathLst>
-          </a:custGeom>
-          <a:noFill/>
-          <a:ln w="38100">
-            <a:solidFill>
+            </a:fontRef>
+          </p:style>
+        </p:cxnSp>
+        <p:cxnSp>
+          <p:nvCxnSpPr>
+            <p:cNvPr id="36" name="Straight Connector 35">
+              <a:extLst>
+                <a:ext uri="{FF2B5EF4-FFF2-40B4-BE49-F238E27FC236}">
+                  <a16:creationId xmlns:a16="http://schemas.microsoft.com/office/drawing/2014/main" id="{6920B928-CF6D-2342-BA4F-5428427C6D8C}"/>
+                </a:ext>
+              </a:extLst>
+            </p:cNvPr>
+            <p:cNvCxnSpPr>
+              <a:cxnSpLocks/>
+              <a:stCxn id="13" idx="0"/>
+              <a:endCxn id="15" idx="4"/>
+            </p:cNvCxnSpPr>
+            <p:nvPr/>
+          </p:nvCxnSpPr>
+          <p:spPr>
+            <a:xfrm flipV="1">
+              <a:off x="4553644" y="2771067"/>
+              <a:ext cx="135593" cy="518436"/>
+            </a:xfrm>
+            <a:prstGeom prst="line">
+              <a:avLst/>
+            </a:prstGeom>
+            <a:ln>
+              <a:solidFill>
+                <a:schemeClr val="tx1"/>
+              </a:solidFill>
+              <a:prstDash val="dash"/>
+            </a:ln>
+          </p:spPr>
+          <p:style>
+            <a:lnRef idx="1">
+              <a:schemeClr val="accent1"/>
+            </a:lnRef>
+            <a:fillRef idx="0">
+              <a:schemeClr val="accent1"/>
+            </a:fillRef>
+            <a:effectRef idx="0">
+              <a:schemeClr val="accent1"/>
+            </a:effectRef>
+            <a:fontRef idx="minor">
               <a:schemeClr val="tx1"/>
-            </a:solidFill>
-            <a:prstDash val="solid"/>
-          </a:ln>
-        </p:spPr>
-        <p:style>
-          <a:lnRef idx="2">
-            <a:schemeClr val="accent1">
-              <a:shade val="50000"/>
-            </a:schemeClr>
-          </a:lnRef>
-          <a:fillRef idx="1">
-            <a:schemeClr val="accent1"/>
-          </a:fillRef>
-          <a:effectRef idx="0">
-            <a:schemeClr val="accent1"/>
-          </a:effectRef>
-          <a:fontRef idx="minor">
-            <a:schemeClr val="lt1"/>
-          </a:fontRef>
-        </p:style>
-        <p:txBody>
-          <a:bodyPr rtlCol="0" anchor="ctr"/>
-          <a:lstStyle/>
-          <a:p>
-            <a:pPr algn="ctr"/>
-            <a:endParaRPr lang="en-US"/>
-          </a:p>
-        </p:txBody>
-      </p:sp>
-      <p:cxnSp>
-        <p:nvCxnSpPr>
-          <p:cNvPr id="9" name="Straight Connector 8">
-            <a:extLst>
-              <a:ext uri="{FF2B5EF4-FFF2-40B4-BE49-F238E27FC236}">
-                <a16:creationId xmlns:a16="http://schemas.microsoft.com/office/drawing/2014/main" id="{52BC8ACA-E777-6841-B9AF-8C674987525C}"/>
-              </a:ext>
-            </a:extLst>
-          </p:cNvPr>
-          <p:cNvCxnSpPr>
-            <a:cxnSpLocks/>
-            <a:stCxn id="12" idx="0"/>
-            <a:endCxn id="11" idx="3"/>
-          </p:cNvCxnSpPr>
-          <p:nvPr/>
-        </p:nvCxnSpPr>
-        <p:spPr>
-          <a:xfrm flipV="1">
-            <a:off x="3790496" y="3188805"/>
-            <a:ext cx="198028" cy="595364"/>
-          </a:xfrm>
-          <a:prstGeom prst="line">
-            <a:avLst/>
-          </a:prstGeom>
-          <a:ln>
-            <a:solidFill>
+            </a:fontRef>
+          </p:style>
+        </p:cxnSp>
+        <p:cxnSp>
+          <p:nvCxnSpPr>
+            <p:cNvPr id="44" name="Straight Connector 43">
+              <a:extLst>
+                <a:ext uri="{FF2B5EF4-FFF2-40B4-BE49-F238E27FC236}">
+                  <a16:creationId xmlns:a16="http://schemas.microsoft.com/office/drawing/2014/main" id="{C0203CC3-AF3F-5849-938F-32FDBE5FF601}"/>
+                </a:ext>
+              </a:extLst>
+            </p:cNvPr>
+            <p:cNvCxnSpPr>
+              <a:cxnSpLocks/>
+              <a:stCxn id="16" idx="1"/>
+              <a:endCxn id="15" idx="5"/>
+            </p:cNvCxnSpPr>
+            <p:nvPr/>
+          </p:nvCxnSpPr>
+          <p:spPr>
+            <a:xfrm flipH="1" flipV="1">
+              <a:off x="4713686" y="2760939"/>
+              <a:ext cx="369996" cy="103066"/>
+            </a:xfrm>
+            <a:prstGeom prst="line">
+              <a:avLst/>
+            </a:prstGeom>
+            <a:ln>
+              <a:solidFill>
+                <a:schemeClr val="tx1"/>
+              </a:solidFill>
+              <a:prstDash val="dash"/>
+            </a:ln>
+          </p:spPr>
+          <p:style>
+            <a:lnRef idx="1">
+              <a:schemeClr val="accent1"/>
+            </a:lnRef>
+            <a:fillRef idx="0">
+              <a:schemeClr val="accent1"/>
+            </a:fillRef>
+            <a:effectRef idx="0">
+              <a:schemeClr val="accent1"/>
+            </a:effectRef>
+            <a:fontRef idx="minor">
               <a:schemeClr val="tx1"/>
-            </a:solidFill>
-            <a:prstDash val="dash"/>
-          </a:ln>
-        </p:spPr>
-        <p:style>
-          <a:lnRef idx="1">
-            <a:schemeClr val="accent1"/>
-          </a:lnRef>
-          <a:fillRef idx="0">
-            <a:schemeClr val="accent1"/>
-          </a:fillRef>
-          <a:effectRef idx="0">
-            <a:schemeClr val="accent1"/>
-          </a:effectRef>
-          <a:fontRef idx="minor">
-            <a:schemeClr val="tx1"/>
-          </a:fontRef>
-        </p:style>
-      </p:cxnSp>
-      <p:cxnSp>
-        <p:nvCxnSpPr>
-          <p:cNvPr id="35" name="Straight Connector 34">
-            <a:extLst>
-              <a:ext uri="{FF2B5EF4-FFF2-40B4-BE49-F238E27FC236}">
-                <a16:creationId xmlns:a16="http://schemas.microsoft.com/office/drawing/2014/main" id="{651702C8-5FEB-3F4F-8909-81C03297064E}"/>
-              </a:ext>
-            </a:extLst>
-          </p:cNvPr>
-          <p:cNvCxnSpPr>
-            <a:cxnSpLocks/>
-            <a:stCxn id="13" idx="2"/>
-            <a:endCxn id="11" idx="6"/>
-          </p:cNvCxnSpPr>
-          <p:nvPr/>
-        </p:nvCxnSpPr>
-        <p:spPr>
-          <a:xfrm flipH="1" flipV="1">
-            <a:off x="4047551" y="3164356"/>
-            <a:ext cx="471515" cy="159725"/>
-          </a:xfrm>
-          <a:prstGeom prst="line">
-            <a:avLst/>
-          </a:prstGeom>
-          <a:ln>
-            <a:solidFill>
+            </a:fontRef>
+          </p:style>
+        </p:cxnSp>
+        <p:cxnSp>
+          <p:nvCxnSpPr>
+            <p:cNvPr id="45" name="Straight Connector 44">
+              <a:extLst>
+                <a:ext uri="{FF2B5EF4-FFF2-40B4-BE49-F238E27FC236}">
+                  <a16:creationId xmlns:a16="http://schemas.microsoft.com/office/drawing/2014/main" id="{4EF08A71-AB59-E24C-932D-EC813FF603BC}"/>
+                </a:ext>
+              </a:extLst>
+            </p:cNvPr>
+            <p:cNvCxnSpPr>
+              <a:cxnSpLocks/>
+              <a:stCxn id="16" idx="7"/>
+              <a:endCxn id="17" idx="3"/>
+            </p:cNvCxnSpPr>
+            <p:nvPr/>
+          </p:nvCxnSpPr>
+          <p:spPr>
+            <a:xfrm flipV="1">
+              <a:off x="5132581" y="2622439"/>
+              <a:ext cx="377816" cy="241566"/>
+            </a:xfrm>
+            <a:prstGeom prst="line">
+              <a:avLst/>
+            </a:prstGeom>
+            <a:ln>
+              <a:solidFill>
+                <a:schemeClr val="tx1"/>
+              </a:solidFill>
+              <a:prstDash val="dash"/>
+            </a:ln>
+          </p:spPr>
+          <p:style>
+            <a:lnRef idx="1">
+              <a:schemeClr val="accent1"/>
+            </a:lnRef>
+            <a:fillRef idx="0">
+              <a:schemeClr val="accent1"/>
+            </a:fillRef>
+            <a:effectRef idx="0">
+              <a:schemeClr val="accent1"/>
+            </a:effectRef>
+            <a:fontRef idx="minor">
               <a:schemeClr val="tx1"/>
-            </a:solidFill>
-            <a:prstDash val="dash"/>
-          </a:ln>
-        </p:spPr>
-        <p:style>
-          <a:lnRef idx="1">
-            <a:schemeClr val="accent1"/>
-          </a:lnRef>
-          <a:fillRef idx="0">
-            <a:schemeClr val="accent1"/>
-          </a:fillRef>
-          <a:effectRef idx="0">
-            <a:schemeClr val="accent1"/>
-          </a:effectRef>
-          <a:fontRef idx="minor">
-            <a:schemeClr val="tx1"/>
-          </a:fontRef>
-        </p:style>
-      </p:cxnSp>
-      <p:cxnSp>
-        <p:nvCxnSpPr>
-          <p:cNvPr id="36" name="Straight Connector 35">
-            <a:extLst>
-              <a:ext uri="{FF2B5EF4-FFF2-40B4-BE49-F238E27FC236}">
-                <a16:creationId xmlns:a16="http://schemas.microsoft.com/office/drawing/2014/main" id="{6920B928-CF6D-2342-BA4F-5428427C6D8C}"/>
-              </a:ext>
-            </a:extLst>
-          </p:cNvPr>
-          <p:cNvCxnSpPr>
-            <a:cxnSpLocks/>
-            <a:stCxn id="13" idx="0"/>
-            <a:endCxn id="15" idx="4"/>
-          </p:cNvCxnSpPr>
-          <p:nvPr/>
-        </p:nvCxnSpPr>
-        <p:spPr>
-          <a:xfrm flipV="1">
-            <a:off x="4553644" y="2771067"/>
-            <a:ext cx="135593" cy="518436"/>
-          </a:xfrm>
-          <a:prstGeom prst="line">
-            <a:avLst/>
-          </a:prstGeom>
-          <a:ln>
-            <a:solidFill>
+            </a:fontRef>
+          </p:style>
+        </p:cxnSp>
+        <p:cxnSp>
+          <p:nvCxnSpPr>
+            <p:cNvPr id="46" name="Straight Connector 45">
+              <a:extLst>
+                <a:ext uri="{FF2B5EF4-FFF2-40B4-BE49-F238E27FC236}">
+                  <a16:creationId xmlns:a16="http://schemas.microsoft.com/office/drawing/2014/main" id="{EE994F8E-2CD5-514C-BD7F-0F4AA230559E}"/>
+                </a:ext>
+              </a:extLst>
+            </p:cNvPr>
+            <p:cNvCxnSpPr>
+              <a:cxnSpLocks/>
+              <a:stCxn id="10" idx="1"/>
+              <a:endCxn id="17" idx="5"/>
+            </p:cNvCxnSpPr>
+            <p:nvPr/>
+          </p:nvCxnSpPr>
+          <p:spPr>
+            <a:xfrm flipH="1" flipV="1">
+              <a:off x="5559296" y="2622439"/>
+              <a:ext cx="389307" cy="241566"/>
+            </a:xfrm>
+            <a:prstGeom prst="line">
+              <a:avLst/>
+            </a:prstGeom>
+            <a:ln>
+              <a:solidFill>
+                <a:schemeClr val="tx1"/>
+              </a:solidFill>
+              <a:prstDash val="dash"/>
+            </a:ln>
+          </p:spPr>
+          <p:style>
+            <a:lnRef idx="1">
+              <a:schemeClr val="accent1"/>
+            </a:lnRef>
+            <a:fillRef idx="0">
+              <a:schemeClr val="accent1"/>
+            </a:fillRef>
+            <a:effectRef idx="0">
+              <a:schemeClr val="accent1"/>
+            </a:effectRef>
+            <a:fontRef idx="minor">
               <a:schemeClr val="tx1"/>
-            </a:solidFill>
-            <a:prstDash val="dash"/>
-          </a:ln>
-        </p:spPr>
-        <p:style>
-          <a:lnRef idx="1">
-            <a:schemeClr val="accent1"/>
-          </a:lnRef>
-          <a:fillRef idx="0">
-            <a:schemeClr val="accent1"/>
-          </a:fillRef>
-          <a:effectRef idx="0">
-            <a:schemeClr val="accent1"/>
-          </a:effectRef>
-          <a:fontRef idx="minor">
-            <a:schemeClr val="tx1"/>
-          </a:fontRef>
-        </p:style>
-      </p:cxnSp>
-      <p:cxnSp>
-        <p:nvCxnSpPr>
-          <p:cNvPr id="44" name="Straight Connector 43">
-            <a:extLst>
-              <a:ext uri="{FF2B5EF4-FFF2-40B4-BE49-F238E27FC236}">
-                <a16:creationId xmlns:a16="http://schemas.microsoft.com/office/drawing/2014/main" id="{C0203CC3-AF3F-5849-938F-32FDBE5FF601}"/>
-              </a:ext>
-            </a:extLst>
-          </p:cNvPr>
-          <p:cNvCxnSpPr>
-            <a:cxnSpLocks/>
-            <a:stCxn id="16" idx="1"/>
-            <a:endCxn id="15" idx="5"/>
-          </p:cNvCxnSpPr>
-          <p:nvPr/>
-        </p:nvCxnSpPr>
-        <p:spPr>
-          <a:xfrm flipH="1" flipV="1">
-            <a:off x="4713686" y="2760939"/>
-            <a:ext cx="369996" cy="103066"/>
-          </a:xfrm>
-          <a:prstGeom prst="line">
-            <a:avLst/>
-          </a:prstGeom>
-          <a:ln>
-            <a:solidFill>
+            </a:fontRef>
+          </p:style>
+        </p:cxnSp>
+        <p:cxnSp>
+          <p:nvCxnSpPr>
+            <p:cNvPr id="50" name="Straight Connector 49">
+              <a:extLst>
+                <a:ext uri="{FF2B5EF4-FFF2-40B4-BE49-F238E27FC236}">
+                  <a16:creationId xmlns:a16="http://schemas.microsoft.com/office/drawing/2014/main" id="{41CE1CDD-5602-5B40-A371-A32AD2094B89}"/>
+                </a:ext>
+              </a:extLst>
+            </p:cNvPr>
+            <p:cNvCxnSpPr>
+              <a:cxnSpLocks/>
+            </p:cNvCxnSpPr>
+            <p:nvPr/>
+          </p:nvCxnSpPr>
+          <p:spPr>
+            <a:xfrm flipH="1">
+              <a:off x="5500269" y="3462704"/>
+              <a:ext cx="253680" cy="0"/>
+            </a:xfrm>
+            <a:prstGeom prst="line">
+              <a:avLst/>
+            </a:prstGeom>
+            <a:ln w="12700">
+              <a:solidFill>
+                <a:schemeClr val="tx1"/>
+              </a:solidFill>
+              <a:prstDash val="dash"/>
+            </a:ln>
+          </p:spPr>
+          <p:style>
+            <a:lnRef idx="1">
+              <a:schemeClr val="accent1"/>
+            </a:lnRef>
+            <a:fillRef idx="0">
+              <a:schemeClr val="accent1"/>
+            </a:fillRef>
+            <a:effectRef idx="0">
+              <a:schemeClr val="accent1"/>
+            </a:effectRef>
+            <a:fontRef idx="minor">
               <a:schemeClr val="tx1"/>
-            </a:solidFill>
-            <a:prstDash val="dash"/>
-          </a:ln>
-        </p:spPr>
-        <p:style>
-          <a:lnRef idx="1">
-            <a:schemeClr val="accent1"/>
-          </a:lnRef>
-          <a:fillRef idx="0">
-            <a:schemeClr val="accent1"/>
-          </a:fillRef>
-          <a:effectRef idx="0">
-            <a:schemeClr val="accent1"/>
-          </a:effectRef>
-          <a:fontRef idx="minor">
-            <a:schemeClr val="tx1"/>
-          </a:fontRef>
-        </p:style>
-      </p:cxnSp>
-      <p:cxnSp>
-        <p:nvCxnSpPr>
-          <p:cNvPr id="45" name="Straight Connector 44">
-            <a:extLst>
-              <a:ext uri="{FF2B5EF4-FFF2-40B4-BE49-F238E27FC236}">
-                <a16:creationId xmlns:a16="http://schemas.microsoft.com/office/drawing/2014/main" id="{4EF08A71-AB59-E24C-932D-EC813FF603BC}"/>
-              </a:ext>
-            </a:extLst>
-          </p:cNvPr>
-          <p:cNvCxnSpPr>
-            <a:cxnSpLocks/>
-            <a:stCxn id="16" idx="7"/>
-            <a:endCxn id="17" idx="3"/>
-          </p:cNvCxnSpPr>
-          <p:nvPr/>
-        </p:nvCxnSpPr>
-        <p:spPr>
-          <a:xfrm flipV="1">
-            <a:off x="5132581" y="2622439"/>
-            <a:ext cx="377816" cy="241566"/>
-          </a:xfrm>
-          <a:prstGeom prst="line">
-            <a:avLst/>
-          </a:prstGeom>
-          <a:ln>
-            <a:solidFill>
+            </a:fontRef>
+          </p:style>
+        </p:cxnSp>
+        <mc:AlternateContent xmlns:mc="http://schemas.openxmlformats.org/markup-compatibility/2006">
+          <mc:Choice xmlns:a14="http://schemas.microsoft.com/office/drawing/2010/main" Requires="a14">
+            <p:sp>
+              <p:nvSpPr>
+                <p:cNvPr id="52" name="TextBox 51">
+                  <a:extLst>
+                    <a:ext uri="{FF2B5EF4-FFF2-40B4-BE49-F238E27FC236}">
+                      <a16:creationId xmlns:a16="http://schemas.microsoft.com/office/drawing/2014/main" id="{1F287006-69C4-B84A-BFD5-A792B1FEED05}"/>
+                    </a:ext>
+                  </a:extLst>
+                </p:cNvPr>
+                <p:cNvSpPr txBox="1"/>
+                <p:nvPr/>
+              </p:nvSpPr>
+              <p:spPr>
+                <a:xfrm>
+                  <a:off x="5838529" y="3207661"/>
+                  <a:ext cx="1019189" cy="472502"/>
+                </a:xfrm>
+                <a:prstGeom prst="rect">
+                  <a:avLst/>
+                </a:prstGeom>
+                <a:noFill/>
+              </p:spPr>
+              <p:txBody>
+                <a:bodyPr wrap="none" lIns="0" tIns="0" rIns="0" bIns="0" rtlCol="0">
+                  <a:spAutoFit/>
+                </a:bodyPr>
+                <a:lstStyle/>
+                <a:p>
+                  <a14:m>
+                    <m:oMathPara xmlns:m="http://schemas.openxmlformats.org/officeDocument/2006/math">
+                      <m:oMathParaPr>
+                        <m:jc m:val="centerGroup"/>
+                      </m:oMathParaPr>
+                      <m:oMath xmlns:m="http://schemas.openxmlformats.org/officeDocument/2006/math">
+                        <m:f>
+                          <m:fPr>
+                            <m:ctrlPr>
+                              <a:rPr lang="en-US" i="1">
+                                <a:latin typeface="Cambria Math" panose="02040503050406030204" pitchFamily="18" charset="0"/>
+                              </a:rPr>
+                            </m:ctrlPr>
+                          </m:fPr>
+                          <m:num>
+                            <m:sSub>
+                              <m:sSubPr>
+                                <m:ctrlPr>
+                                  <a:rPr lang="en-US" i="1">
+                                    <a:latin typeface="Cambria Math" panose="02040503050406030204" pitchFamily="18" charset="0"/>
+                                  </a:rPr>
+                                </m:ctrlPr>
+                              </m:sSubPr>
+                              <m:e>
+                                <m:r>
+                                  <a:rPr lang="en-US" i="1">
+                                    <a:latin typeface="Cambria Math" panose="02040503050406030204" pitchFamily="18" charset="0"/>
+                                  </a:rPr>
+                                  <m:t>𝑦</m:t>
+                                </m:r>
+                              </m:e>
+                              <m:sub>
+                                <m:r>
+                                  <a:rPr lang="en-US" b="0" i="1">
+                                    <a:latin typeface="Cambria Math" panose="02040503050406030204" pitchFamily="18" charset="0"/>
+                                  </a:rPr>
+                                  <m:t>𝑡</m:t>
+                                </m:r>
+                                <m:r>
+                                  <a:rPr lang="en-US" b="0" i="1">
+                                    <a:latin typeface="Cambria Math" panose="02040503050406030204" pitchFamily="18" charset="0"/>
+                                  </a:rPr>
+                                  <m:t>+1</m:t>
+                                </m:r>
+                              </m:sub>
+                            </m:sSub>
+                            <m:r>
+                              <a:rPr lang="en-US" i="1">
+                                <a:latin typeface="Cambria Math" panose="02040503050406030204" pitchFamily="18" charset="0"/>
+                              </a:rPr>
+                              <m:t>− </m:t>
+                            </m:r>
+                            <m:sSub>
+                              <m:sSubPr>
+                                <m:ctrlPr>
+                                  <a:rPr lang="en-US" i="1">
+                                    <a:latin typeface="Cambria Math" panose="02040503050406030204" pitchFamily="18" charset="0"/>
+                                  </a:rPr>
+                                </m:ctrlPr>
+                              </m:sSubPr>
+                              <m:e>
+                                <m:r>
+                                  <a:rPr lang="en-US" i="1">
+                                    <a:latin typeface="Cambria Math" panose="02040503050406030204" pitchFamily="18" charset="0"/>
+                                  </a:rPr>
+                                  <m:t>𝑦</m:t>
+                                </m:r>
+                              </m:e>
+                              <m:sub>
+                                <m:r>
+                                  <a:rPr lang="en-US" b="0" i="1">
+                                    <a:latin typeface="Cambria Math" panose="02040503050406030204" pitchFamily="18" charset="0"/>
+                                  </a:rPr>
+                                  <m:t>𝑡</m:t>
+                                </m:r>
+                              </m:sub>
+                            </m:sSub>
+                          </m:num>
+                          <m:den>
+                            <m:r>
+                              <m:rPr>
+                                <m:sty m:val="p"/>
+                              </m:rPr>
+                              <a:rPr lang="en-US" b="0" i="0">
+                                <a:latin typeface="Cambria Math" panose="02040503050406030204" pitchFamily="18" charset="0"/>
+                              </a:rPr>
+                              <m:t>Δ</m:t>
+                            </m:r>
+                            <m:r>
+                              <a:rPr lang="en-US" b="0" i="1">
+                                <a:latin typeface="Cambria Math" panose="02040503050406030204" pitchFamily="18" charset="0"/>
+                              </a:rPr>
+                              <m:t>𝑡</m:t>
+                            </m:r>
+                          </m:den>
+                        </m:f>
+                      </m:oMath>
+                    </m:oMathPara>
+                  </a14:m>
+                </a:p>
+              </p:txBody>
+            </p:sp>
+          </mc:Choice>
+          <mc:Fallback>
+            <p:sp>
+              <p:nvSpPr>
+                <p:cNvPr id="52" name="TextBox 51">
+                  <a:extLst>
+                    <a:ext uri="{FF2B5EF4-FFF2-40B4-BE49-F238E27FC236}">
+                      <a16:creationId xmlns:a16="http://schemas.microsoft.com/office/drawing/2014/main" id="{1F287006-69C4-B84A-BFD5-A792B1FEED05}"/>
+                    </a:ext>
+                  </a:extLst>
+                </p:cNvPr>
+                <p:cNvSpPr txBox="1">
+                  <a:spLocks noRot="1" noChangeAspect="1" noMove="1" noResize="1" noEditPoints="1" noAdjustHandles="1" noChangeArrowheads="1" noChangeShapeType="1" noTextEdit="1"/>
+                </p:cNvSpPr>
+                <p:nvPr/>
+              </p:nvSpPr>
+              <p:spPr>
+                <a:xfrm>
+                  <a:off x="5838529" y="3207661"/>
+                  <a:ext cx="1019189" cy="472502"/>
+                </a:xfrm>
+                <a:prstGeom prst="rect">
+                  <a:avLst/>
+                </a:prstGeom>
+                <a:blipFill>
+                  <a:blip r:embed="rId4"/>
+                  <a:stretch>
+                    <a:fillRect l="-3704" t="-18421" r="-16049" b="-15789"/>
+                  </a:stretch>
+                </a:blipFill>
+              </p:spPr>
+              <p:txBody>
+                <a:bodyPr/>
+                <a:lstStyle/>
+                <a:p>
+                  <a:r>
+                    <a:rPr lang="en-US">
+                      <a:noFill/>
+                    </a:rPr>
+                    <a:t> </a:t>
+                  </a:r>
+                </a:p>
+              </p:txBody>
+            </p:sp>
+          </mc:Fallback>
+        </mc:AlternateContent>
+        <p:cxnSp>
+          <p:nvCxnSpPr>
+            <p:cNvPr id="56" name="Straight Connector 55">
+              <a:extLst>
+                <a:ext uri="{FF2B5EF4-FFF2-40B4-BE49-F238E27FC236}">
+                  <a16:creationId xmlns:a16="http://schemas.microsoft.com/office/drawing/2014/main" id="{F75357CA-42A9-0B4D-A03C-FA517A4089A3}"/>
+                </a:ext>
+              </a:extLst>
+            </p:cNvPr>
+            <p:cNvCxnSpPr/>
+            <p:nvPr/>
+          </p:nvCxnSpPr>
+          <p:spPr>
+            <a:xfrm>
+              <a:off x="5507007" y="3954780"/>
+              <a:ext cx="275843" cy="0"/>
+            </a:xfrm>
+            <a:prstGeom prst="line">
+              <a:avLst/>
+            </a:prstGeom>
+            <a:ln w="38100" cap="rnd">
+              <a:solidFill>
+                <a:schemeClr val="tx1"/>
+              </a:solidFill>
+            </a:ln>
+          </p:spPr>
+          <p:style>
+            <a:lnRef idx="1">
+              <a:schemeClr val="accent1"/>
+            </a:lnRef>
+            <a:fillRef idx="0">
+              <a:schemeClr val="accent1"/>
+            </a:fillRef>
+            <a:effectRef idx="0">
+              <a:schemeClr val="accent1"/>
+            </a:effectRef>
+            <a:fontRef idx="minor">
               <a:schemeClr val="tx1"/>
-            </a:solidFill>
-            <a:prstDash val="dash"/>
-          </a:ln>
-        </p:spPr>
-        <p:style>
-          <a:lnRef idx="1">
-            <a:schemeClr val="accent1"/>
-          </a:lnRef>
-          <a:fillRef idx="0">
-            <a:schemeClr val="accent1"/>
-          </a:fillRef>
-          <a:effectRef idx="0">
-            <a:schemeClr val="accent1"/>
-          </a:effectRef>
-          <a:fontRef idx="minor">
-            <a:schemeClr val="tx1"/>
-          </a:fontRef>
-        </p:style>
-      </p:cxnSp>
-      <p:cxnSp>
-        <p:nvCxnSpPr>
-          <p:cNvPr id="46" name="Straight Connector 45">
-            <a:extLst>
-              <a:ext uri="{FF2B5EF4-FFF2-40B4-BE49-F238E27FC236}">
-                <a16:creationId xmlns:a16="http://schemas.microsoft.com/office/drawing/2014/main" id="{EE994F8E-2CD5-514C-BD7F-0F4AA230559E}"/>
-              </a:ext>
-            </a:extLst>
-          </p:cNvPr>
-          <p:cNvCxnSpPr>
-            <a:cxnSpLocks/>
-            <a:stCxn id="10" idx="1"/>
-            <a:endCxn id="17" idx="5"/>
-          </p:cNvCxnSpPr>
-          <p:nvPr/>
-        </p:nvCxnSpPr>
-        <p:spPr>
-          <a:xfrm flipH="1" flipV="1">
-            <a:off x="5559296" y="2622439"/>
-            <a:ext cx="389307" cy="241566"/>
-          </a:xfrm>
-          <a:prstGeom prst="line">
-            <a:avLst/>
-          </a:prstGeom>
-          <a:ln>
-            <a:solidFill>
-              <a:schemeClr val="tx1"/>
-            </a:solidFill>
-            <a:prstDash val="dash"/>
-          </a:ln>
-        </p:spPr>
-        <p:style>
-          <a:lnRef idx="1">
-            <a:schemeClr val="accent1"/>
-          </a:lnRef>
-          <a:fillRef idx="0">
-            <a:schemeClr val="accent1"/>
-          </a:fillRef>
-          <a:effectRef idx="0">
-            <a:schemeClr val="accent1"/>
-          </a:effectRef>
-          <a:fontRef idx="minor">
-            <a:schemeClr val="tx1"/>
-          </a:fontRef>
-        </p:style>
-      </p:cxnSp>
+            </a:fontRef>
+          </p:style>
+        </p:cxnSp>
+        <p:sp>
+          <p:nvSpPr>
+            <p:cNvPr id="58" name="TextBox 57">
+              <a:extLst>
+                <a:ext uri="{FF2B5EF4-FFF2-40B4-BE49-F238E27FC236}">
+                  <a16:creationId xmlns:a16="http://schemas.microsoft.com/office/drawing/2014/main" id="{69E78C9C-BEC0-EA41-9123-095144DAADE9}"/>
+                </a:ext>
+              </a:extLst>
+            </p:cNvPr>
+            <p:cNvSpPr txBox="1"/>
+            <p:nvPr/>
+          </p:nvSpPr>
+          <p:spPr>
+            <a:xfrm>
+              <a:off x="5782850" y="3756697"/>
+              <a:ext cx="885562" cy="369332"/>
+            </a:xfrm>
+            <a:prstGeom prst="rect">
+              <a:avLst/>
+            </a:prstGeom>
+            <a:noFill/>
+          </p:spPr>
+          <p:txBody>
+            <a:bodyPr wrap="square" rtlCol="0">
+              <a:spAutoFit/>
+            </a:bodyPr>
+            <a:lstStyle/>
+            <a:p>
+              <a:pPr algn="ctr"/>
+              <a:r>
+                <a:rPr lang="en-US"/>
+                <a:t>Best fit</a:t>
+              </a:r>
+            </a:p>
+          </p:txBody>
+        </p:sp>
+      </p:grpSp>
     </p:spTree>
     <p:extLst>
       <p:ext uri="{BB962C8B-B14F-4D97-AF65-F5344CB8AC3E}">

</xml_diff>